<commit_message>
added boilerplate code for multisignature wallet
</commit_message>
<xml_diff>
--- a/ppts/Lecture 4.pptx
+++ b/ppts/Lecture 4.pptx
@@ -624,6 +624,90 @@
     <p:extLst>
       <p:ext uri="{BB962C8B-B14F-4D97-AF65-F5344CB8AC3E}">
         <p14:creationId xmlns:p14="http://schemas.microsoft.com/office/powerpoint/2010/main" val="883756695"/>
+      </p:ext>
+    </p:extLst>
+  </p:cSld>
+  <p:clrMapOvr>
+    <a:masterClrMapping/>
+  </p:clrMapOvr>
+</p:notes>
+</file>
+
+<file path=ppt/notesSlides/notesSlide3.xml><?xml version="1.0" encoding="utf-8"?>
+<p:notes xmlns:a="http://schemas.openxmlformats.org/drawingml/2006/main" xmlns:r="http://schemas.openxmlformats.org/officeDocument/2006/relationships" xmlns:p="http://schemas.openxmlformats.org/presentationml/2006/main">
+  <p:cSld>
+    <p:spTree>
+      <p:nvGrpSpPr>
+        <p:cNvPr id="1" name=""/>
+        <p:cNvGrpSpPr/>
+        <p:nvPr/>
+      </p:nvGrpSpPr>
+      <p:grpSpPr>
+        <a:xfrm>
+          <a:off x="0" y="0"/>
+          <a:ext cx="0" cy="0"/>
+          <a:chOff x="0" y="0"/>
+          <a:chExt cx="0" cy="0"/>
+        </a:xfrm>
+      </p:grpSpPr>
+      <p:sp>
+        <p:nvSpPr>
+          <p:cNvPr id="2" name="Slide Image Placeholder 1"/>
+          <p:cNvSpPr>
+            <a:spLocks noGrp="1" noRot="1" noChangeAspect="1"/>
+          </p:cNvSpPr>
+          <p:nvPr>
+            <p:ph type="sldImg"/>
+          </p:nvPr>
+        </p:nvSpPr>
+        <p:spPr/>
+      </p:sp>
+      <p:sp>
+        <p:nvSpPr>
+          <p:cNvPr id="3" name="Notes Placeholder 2"/>
+          <p:cNvSpPr>
+            <a:spLocks noGrp="1"/>
+          </p:cNvSpPr>
+          <p:nvPr>
+            <p:ph type="body" idx="1"/>
+          </p:nvPr>
+        </p:nvSpPr>
+        <p:spPr/>
+        <p:txBody>
+          <a:bodyPr/>
+          <a:lstStyle/>
+          <a:p>
+            <a:endParaRPr lang="en-US" dirty="0"/>
+          </a:p>
+        </p:txBody>
+      </p:sp>
+      <p:sp>
+        <p:nvSpPr>
+          <p:cNvPr id="4" name="Slide Number Placeholder 3"/>
+          <p:cNvSpPr>
+            <a:spLocks noGrp="1"/>
+          </p:cNvSpPr>
+          <p:nvPr>
+            <p:ph type="sldNum" sz="quarter" idx="10"/>
+          </p:nvPr>
+        </p:nvSpPr>
+        <p:spPr/>
+        <p:txBody>
+          <a:bodyPr/>
+          <a:lstStyle/>
+          <a:p>
+            <a:fld id="{2E9A5123-6EEE-D24D-BCD8-66D5714811C3}" type="slidenum">
+              <a:rPr lang="en-US" smtClean="0"/>
+              <a:t>6</a:t>
+            </a:fld>
+            <a:endParaRPr lang="en-US"/>
+          </a:p>
+        </p:txBody>
+      </p:sp>
+    </p:spTree>
+    <p:extLst>
+      <p:ext uri="{BB962C8B-B14F-4D97-AF65-F5344CB8AC3E}">
+        <p14:creationId xmlns:p14="http://schemas.microsoft.com/office/powerpoint/2010/main" val="1053985574"/>
       </p:ext>
     </p:extLst>
   </p:cSld>
@@ -3554,6 +3638,13 @@
   <p:clrMapOvr>
     <a:masterClrMapping/>
   </p:clrMapOvr>
+  <p:timing>
+    <p:tnLst>
+      <p:par>
+        <p:cTn id="1" dur="indefinite" restart="never" nodeType="tmRoot"/>
+      </p:par>
+    </p:tnLst>
+  </p:timing>
 </p:sld>
 </file>
 
@@ -3645,6 +3736,13 @@
   <p:clrMapOvr>
     <a:masterClrMapping/>
   </p:clrMapOvr>
+  <p:timing>
+    <p:tnLst>
+      <p:par>
+        <p:cTn id="1" dur="indefinite" restart="never" nodeType="tmRoot"/>
+      </p:par>
+    </p:tnLst>
+  </p:timing>
 </p:sld>
 </file>
 
@@ -3748,6 +3846,13 @@
   <p:clrMapOvr>
     <a:masterClrMapping/>
   </p:clrMapOvr>
+  <p:timing>
+    <p:tnLst>
+      <p:par>
+        <p:cTn id="1" dur="indefinite" restart="never" nodeType="tmRoot"/>
+      </p:par>
+    </p:tnLst>
+  </p:timing>
 </p:sld>
 </file>
 
@@ -3901,6 +4006,13 @@
   <p:clrMapOvr>
     <a:masterClrMapping/>
   </p:clrMapOvr>
+  <p:timing>
+    <p:tnLst>
+      <p:par>
+        <p:cTn id="1" dur="indefinite" restart="never" nodeType="tmRoot"/>
+      </p:par>
+    </p:tnLst>
+  </p:timing>
 </p:sld>
 </file>
 
@@ -4081,7 +4193,7 @@
             </a:r>
             <a:r>
               <a:rPr lang="en-US" sz="2000" b="1" dirty="0" smtClean="0"/>
-              <a:t> a + 1) * 98.5</a:t>
+              <a:t> a + 1) * 98.5%</a:t>
             </a:r>
           </a:p>
           <a:p>
@@ -4106,6 +4218,13 @@
   <p:clrMapOvr>
     <a:masterClrMapping/>
   </p:clrMapOvr>
+  <p:timing>
+    <p:tnLst>
+      <p:par>
+        <p:cTn id="1" dur="indefinite" restart="never" nodeType="tmRoot"/>
+      </p:par>
+    </p:tnLst>
+  </p:timing>
 </p:sld>
 </file>
 
@@ -4168,7 +4287,12 @@
               <a:rPr lang="en-US" dirty="0" smtClean="0"/>
               <a:t>Create a CLI tool that deploys this contract to the development network</a:t>
             </a:r>
-            <a:endParaRPr lang="en-US" dirty="0" smtClean="0"/>
+          </a:p>
+          <a:p>
+            <a:r>
+              <a:rPr lang="en-US" dirty="0" smtClean="0"/>
+              <a:t>Create a CLI that sends transaction `bet` to contract</a:t>
+            </a:r>
           </a:p>
           <a:p>
             <a:r>
@@ -4197,6 +4321,13 @@
   <p:clrMapOvr>
     <a:masterClrMapping/>
   </p:clrMapOvr>
+  <p:timing>
+    <p:tnLst>
+      <p:par>
+        <p:cTn id="1" dur="indefinite" restart="never" nodeType="tmRoot"/>
+      </p:par>
+    </p:tnLst>
+  </p:timing>
 </p:sld>
 </file>
 

</xml_diff>